<commit_message>
Bumped timing up a smig
Tiny HANDS!
</commit_message>
<xml_diff>
--- a/CMQA/Presentations/First-Semester-Presentation.pptx
+++ b/CMQA/Presentations/First-Semester-Presentation.pptx
@@ -12246,15 +12246,7 @@
                   <a:srgbClr val="000000"/>
                 </a:solidFill>
               </a:rPr>
-              <a:t>Team </a:t>
-            </a:r>
-            <a:r>
-              <a:rPr lang="en-US" altLang="en-US" sz="2400" dirty="0">
-                <a:solidFill>
-                  <a:srgbClr val="000000"/>
-                </a:solidFill>
-              </a:rPr>
-              <a:t>Bravo</a:t>
+              <a:t>Team Bravo</a:t>
             </a:r>
           </a:p>
           <a:p>
@@ -13973,12 +13965,12 @@
   <p:clrMapOvr>
     <a:masterClrMapping/>
   </p:clrMapOvr>
-  <mc:AlternateContent xmlns:mc="http://schemas.openxmlformats.org/markup-compatibility/2006" xmlns:p14="http://schemas.microsoft.com/office/powerpoint/2010/main">
-    <mc:Choice Requires="p14">
-      <p:transition spd="slow" p14:dur="2000" advTm="1111"/>
+  <mc:AlternateContent xmlns:mc="http://schemas.openxmlformats.org/markup-compatibility/2006">
+    <mc:Choice xmlns:p14="http://schemas.microsoft.com/office/powerpoint/2010/main" Requires="p14">
+      <p:transition spd="slow" p14:dur="2000" advTm="1250"/>
     </mc:Choice>
-    <mc:Fallback xmlns="">
-      <p:transition spd="slow" advTm="1111"/>
+    <mc:Fallback>
+      <p:transition spd="slow" advTm="1250"/>
     </mc:Fallback>
   </mc:AlternateContent>
   <p:timing>
@@ -15001,15 +14993,7 @@
                   <a:srgbClr val="000000"/>
                 </a:solidFill>
               </a:rPr>
-              <a:t>More </a:t>
-            </a:r>
-            <a:r>
-              <a:rPr lang="en-US" altLang="en-US" dirty="0" smtClean="0">
-                <a:solidFill>
-                  <a:srgbClr val="000000"/>
-                </a:solidFill>
-              </a:rPr>
-              <a:t>power available</a:t>
+              <a:t>More power available</a:t>
             </a:r>
           </a:p>
           <a:p>
@@ -16349,12 +16333,12 @@
   <p:clrMapOvr>
     <a:masterClrMapping/>
   </p:clrMapOvr>
-  <mc:AlternateContent xmlns:mc="http://schemas.openxmlformats.org/markup-compatibility/2006" xmlns:p14="http://schemas.microsoft.com/office/powerpoint/2010/main">
-    <mc:Choice Requires="p14">
-      <p:transition spd="slow" p14:dur="2000" advTm="1111"/>
+  <mc:AlternateContent xmlns:mc="http://schemas.openxmlformats.org/markup-compatibility/2006">
+    <mc:Choice xmlns:p14="http://schemas.microsoft.com/office/powerpoint/2010/main" Requires="p14">
+      <p:transition spd="slow" p14:dur="2000" advTm="1250"/>
     </mc:Choice>
-    <mc:Fallback xmlns="">
-      <p:transition spd="slow" advTm="1111"/>
+    <mc:Fallback>
+      <p:transition spd="slow" advTm="1250"/>
     </mc:Fallback>
   </mc:AlternateContent>
   <p:timing>
@@ -17697,7 +17681,7 @@
         <p:nvSpPr>
           <p:cNvPr id="3073" name="Rectangle 1"/>
           <p:cNvSpPr>
-            <a:spLocks noChangeArrowheads="1"/>
+            <a:spLocks noGrp="1" noChangeArrowheads="1"/>
           </p:cNvSpPr>
           <p:nvPr>
             <p:ph type="title"/>
@@ -17733,7 +17717,7 @@
         <p:nvSpPr>
           <p:cNvPr id="3074" name="Rectangle 2"/>
           <p:cNvSpPr>
-            <a:spLocks noChangeArrowheads="1"/>
+            <a:spLocks noGrp="1" noChangeArrowheads="1"/>
           </p:cNvSpPr>
           <p:nvPr>
             <p:ph type="body" idx="1"/>
@@ -18237,12 +18221,12 @@
   <p:clrMapOvr>
     <a:masterClrMapping/>
   </p:clrMapOvr>
-  <mc:AlternateContent xmlns:mc="http://schemas.openxmlformats.org/markup-compatibility/2006" xmlns:p14="http://schemas.microsoft.com/office/powerpoint/2010/main">
-    <mc:Choice Requires="p14">
-      <p:transition spd="slow" p14:dur="2000" advTm="1111"/>
+  <mc:AlternateContent xmlns:mc="http://schemas.openxmlformats.org/markup-compatibility/2006">
+    <mc:Choice xmlns:p14="http://schemas.microsoft.com/office/powerpoint/2010/main" Requires="p14">
+      <p:transition spd="slow" p14:dur="2000" advTm="1250"/>
     </mc:Choice>
-    <mc:Fallback xmlns="">
-      <p:transition spd="slow" advTm="1111"/>
+    <mc:Fallback>
+      <p:transition spd="slow" advTm="1250"/>
     </mc:Fallback>
   </mc:AlternateContent>
   <p:timing>
@@ -18571,12 +18555,12 @@
   <p:clrMapOvr>
     <a:masterClrMapping/>
   </p:clrMapOvr>
-  <mc:AlternateContent xmlns:mc="http://schemas.openxmlformats.org/markup-compatibility/2006" xmlns:p14="http://schemas.microsoft.com/office/powerpoint/2010/main">
-    <mc:Choice Requires="p14">
-      <p:transition spd="slow" p14:dur="2000" advTm="1111"/>
+  <mc:AlternateContent xmlns:mc="http://schemas.openxmlformats.org/markup-compatibility/2006">
+    <mc:Choice xmlns:p14="http://schemas.microsoft.com/office/powerpoint/2010/main" Requires="p14">
+      <p:transition spd="slow" p14:dur="2000" advTm="1250"/>
     </mc:Choice>
-    <mc:Fallback xmlns="">
-      <p:transition spd="slow" advTm="1111"/>
+    <mc:Fallback>
+      <p:transition spd="slow" advTm="1250"/>
     </mc:Fallback>
   </mc:AlternateContent>
   <p:timing>
@@ -34584,12 +34568,12 @@
   <p:clrMapOvr>
     <a:masterClrMapping/>
   </p:clrMapOvr>
-  <mc:AlternateContent xmlns:mc="http://schemas.openxmlformats.org/markup-compatibility/2006" xmlns:p14="http://schemas.microsoft.com/office/powerpoint/2010/main">
-    <mc:Choice Requires="p14">
-      <p:transition spd="slow" p14:dur="2000" advTm="1111"/>
+  <mc:AlternateContent xmlns:mc="http://schemas.openxmlformats.org/markup-compatibility/2006">
+    <mc:Choice xmlns:p14="http://schemas.microsoft.com/office/powerpoint/2010/main" Requires="p14">
+      <p:transition spd="slow" p14:dur="2000" advTm="1250"/>
     </mc:Choice>
-    <mc:Fallback xmlns="">
-      <p:transition spd="slow" advTm="1111"/>
+    <mc:Fallback>
+      <p:transition spd="slow" advTm="1250"/>
     </mc:Fallback>
   </mc:AlternateContent>
   <p:timing>
@@ -35819,12 +35803,12 @@
   <p:clrMapOvr>
     <a:masterClrMapping/>
   </p:clrMapOvr>
-  <mc:AlternateContent xmlns:mc="http://schemas.openxmlformats.org/markup-compatibility/2006" xmlns:p14="http://schemas.microsoft.com/office/powerpoint/2010/main">
-    <mc:Choice Requires="p14">
-      <p:transition spd="slow" p14:dur="2000" advTm="1111"/>
+  <mc:AlternateContent xmlns:mc="http://schemas.openxmlformats.org/markup-compatibility/2006">
+    <mc:Choice xmlns:p14="http://schemas.microsoft.com/office/powerpoint/2010/main" Requires="p14">
+      <p:transition spd="slow" p14:dur="2000" advTm="1250"/>
     </mc:Choice>
-    <mc:Fallback xmlns="">
-      <p:transition spd="slow" advTm="1111"/>
+    <mc:Fallback>
+      <p:transition spd="slow" advTm="1250"/>
     </mc:Fallback>
   </mc:AlternateContent>
   <p:timing>
@@ -37368,14 +37352,6 @@
               </a:rPr>
               <a:t>Rendezvous: performing an orbital maneuver that intentionally decreases the displacement of the spacecraft relative to a resident space object to within 50 meters for at least 5 orbits.</a:t>
             </a:r>
-            <a:endParaRPr lang="en-US" sz="2400" dirty="0">
-              <a:solidFill>
-                <a:schemeClr val="tx1">
-                  <a:lumMod val="85000"/>
-                  <a:lumOff val="15000"/>
-                </a:schemeClr>
-              </a:solidFill>
-            </a:endParaRPr>
           </a:p>
         </p:txBody>
       </p:sp>
@@ -37574,12 +37550,12 @@
   <p:clrMapOvr>
     <a:masterClrMapping/>
   </p:clrMapOvr>
-  <mc:AlternateContent xmlns:mc="http://schemas.openxmlformats.org/markup-compatibility/2006" xmlns:p14="http://schemas.microsoft.com/office/powerpoint/2010/main">
-    <mc:Choice Requires="p14">
-      <p:transition spd="slow" p14:dur="2000" advTm="1111"/>
+  <mc:AlternateContent xmlns:mc="http://schemas.openxmlformats.org/markup-compatibility/2006">
+    <mc:Choice xmlns:p14="http://schemas.microsoft.com/office/powerpoint/2010/main" Requires="p14">
+      <p:transition spd="slow" p14:dur="2000" advTm="1250"/>
     </mc:Choice>
-    <mc:Fallback xmlns="">
-      <p:transition spd="slow" advTm="1111"/>
+    <mc:Fallback>
+      <p:transition spd="slow" advTm="1250"/>
     </mc:Fallback>
   </mc:AlternateContent>
   <p:timing>
@@ -39605,11 +39581,6 @@
                 </a:rPr>
                 <a:t>1.33 kg</a:t>
               </a:r>
-              <a:endParaRPr lang="en-US" altLang="en-US" dirty="0">
-                <a:solidFill>
-                  <a:schemeClr val="tx1"/>
-                </a:solidFill>
-              </a:endParaRPr>
             </a:p>
           </p:txBody>
         </p:sp>
@@ -39719,11 +39690,6 @@
                 </a:rPr>
                 <a:t>2.66 kg</a:t>
               </a:r>
-              <a:endParaRPr lang="en-US" altLang="en-US" dirty="0">
-                <a:solidFill>
-                  <a:schemeClr val="tx1"/>
-                </a:solidFill>
-              </a:endParaRPr>
             </a:p>
           </p:txBody>
         </p:sp>
@@ -39833,11 +39799,6 @@
                 </a:rPr>
                 <a:t>4.00 kg</a:t>
               </a:r>
-              <a:endParaRPr lang="en-US" altLang="en-US" dirty="0">
-                <a:solidFill>
-                  <a:schemeClr val="tx1"/>
-                </a:solidFill>
-              </a:endParaRPr>
             </a:p>
           </p:txBody>
         </p:sp>
@@ -39947,11 +39908,6 @@
                 </a:rPr>
                 <a:t>8.00 kg</a:t>
               </a:r>
-              <a:endParaRPr lang="en-US" altLang="en-US" dirty="0">
-                <a:solidFill>
-                  <a:schemeClr val="tx1"/>
-                </a:solidFill>
-              </a:endParaRPr>
             </a:p>
           </p:txBody>
         </p:sp>
@@ -40175,11 +40131,6 @@
                 </a:rPr>
                 <a:t>&lt; 500 kg</a:t>
               </a:r>
-              <a:endParaRPr lang="en-US" altLang="en-US" dirty="0">
-                <a:solidFill>
-                  <a:schemeClr val="tx1"/>
-                </a:solidFill>
-              </a:endParaRPr>
             </a:p>
           </p:txBody>
         </p:sp>

</xml_diff>